<commit_message>
added my desc and changed slide a bit -SG
</commit_message>
<xml_diff>
--- a/doc/Slide.pptx
+++ b/doc/Slide.pptx
@@ -2,7 +2,7 @@
 <file path=ppt/presentation.xml><?xml version="1.0" encoding="utf-8"?>
 <p:presentation xmlns:a="http://schemas.openxmlformats.org/drawingml/2006/main" xmlns:r="http://schemas.openxmlformats.org/officeDocument/2006/relationships" xmlns:p="http://schemas.openxmlformats.org/presentationml/2006/main" saveSubsetFonts="1">
   <p:sldMasterIdLst>
-    <p:sldMasterId id="2147483660" r:id="rId1"/>
+    <p:sldMasterId id="2147483720" r:id="rId1"/>
   </p:sldMasterIdLst>
   <p:sldIdLst>
     <p:sldId id="256" r:id="rId2"/>
@@ -104,6 +104,11 @@
       </a:defRPr>
     </a:lvl9pPr>
   </p:defaultTextStyle>
+  <p:extLst>
+    <p:ext uri="{EFAFB233-063F-42B5-8137-9DF3F51BA10A}">
+      <p15:sldGuideLst xmlns:p15="http://schemas.microsoft.com/office/powerpoint/2012/main"/>
+    </p:ext>
+  </p:extLst>
 </p:presentation>
 </file>
 
@@ -114,6 +119,11 @@
 <file path=ppt/slideLayouts/slideLayout1.xml><?xml version="1.0" encoding="utf-8"?>
 <p:sldLayout xmlns:a="http://schemas.openxmlformats.org/drawingml/2006/main" xmlns:r="http://schemas.openxmlformats.org/officeDocument/2006/relationships" xmlns:p="http://schemas.openxmlformats.org/presentationml/2006/main" type="title" preserve="1">
   <p:cSld name="Titelfolie">
+    <p:bg>
+      <p:bgRef idx="1001">
+        <a:schemeClr val="bg2"/>
+      </p:bgRef>
+    </p:bg>
     <p:spTree>
       <p:nvGrpSpPr>
         <p:cNvPr id="1" name=""/>
@@ -140,15 +150,24 @@
         </p:nvSpPr>
         <p:spPr>
           <a:xfrm>
-            <a:off x="685800" y="1122363"/>
-            <a:ext cx="7772400" cy="2387600"/>
+            <a:off x="946404" y="758952"/>
+            <a:ext cx="7063740" cy="4041648"/>
           </a:xfrm>
         </p:spPr>
         <p:txBody>
-          <a:bodyPr anchor="b"/>
+          <a:bodyPr anchor="b">
+            <a:normAutofit/>
+          </a:bodyPr>
           <a:lstStyle>
-            <a:lvl1pPr algn="ctr">
-              <a:defRPr sz="6000"/>
+            <a:lvl1pPr algn="l">
+              <a:lnSpc>
+                <a:spcPct val="85000"/>
+              </a:lnSpc>
+              <a:defRPr sz="6200" baseline="0">
+                <a:solidFill>
+                  <a:schemeClr val="tx1"/>
+                </a:solidFill>
+              </a:defRPr>
             </a:lvl1pPr>
           </a:lstStyle>
           <a:p>
@@ -172,16 +191,24 @@
         </p:nvSpPr>
         <p:spPr>
           <a:xfrm>
-            <a:off x="1143000" y="3602038"/>
-            <a:ext cx="6858000" cy="1655762"/>
+            <a:off x="946404" y="4800600"/>
+            <a:ext cx="7063740" cy="1691640"/>
           </a:xfrm>
         </p:spPr>
         <p:txBody>
-          <a:bodyPr/>
+          <a:bodyPr>
+            <a:normAutofit/>
+          </a:bodyPr>
           <a:lstStyle>
-            <a:lvl1pPr marL="0" indent="0" algn="ctr">
-              <a:buNone/>
-              <a:defRPr sz="2400"/>
+            <a:lvl1pPr marL="0" indent="0" algn="l">
+              <a:buNone/>
+              <a:defRPr sz="2000" spc="30" baseline="0">
+                <a:solidFill>
+                  <a:schemeClr val="tx1">
+                    <a:lumMod val="75000"/>
+                  </a:schemeClr>
+                </a:solidFill>
+              </a:defRPr>
             </a:lvl1pPr>
             <a:lvl2pPr marL="457200" indent="0" algn="ctr">
               <a:buNone/>
@@ -189,31 +216,31 @@
             </a:lvl2pPr>
             <a:lvl3pPr marL="914400" indent="0" algn="ctr">
               <a:buNone/>
-              <a:defRPr sz="1800"/>
+              <a:defRPr sz="2000"/>
             </a:lvl3pPr>
             <a:lvl4pPr marL="1371600" indent="0" algn="ctr">
               <a:buNone/>
-              <a:defRPr sz="1600"/>
+              <a:defRPr sz="2000"/>
             </a:lvl4pPr>
             <a:lvl5pPr marL="1828800" indent="0" algn="ctr">
               <a:buNone/>
-              <a:defRPr sz="1600"/>
+              <a:defRPr sz="2000"/>
             </a:lvl5pPr>
             <a:lvl6pPr marL="2286000" indent="0" algn="ctr">
               <a:buNone/>
-              <a:defRPr sz="1600"/>
+              <a:defRPr sz="2000"/>
             </a:lvl6pPr>
             <a:lvl7pPr marL="2743200" indent="0" algn="ctr">
               <a:buNone/>
-              <a:defRPr sz="1600"/>
+              <a:defRPr sz="2000"/>
             </a:lvl7pPr>
             <a:lvl8pPr marL="3200400" indent="0" algn="ctr">
               <a:buNone/>
-              <a:defRPr sz="1600"/>
+              <a:defRPr sz="2000"/>
             </a:lvl8pPr>
             <a:lvl9pPr marL="3657600" indent="0" algn="ctr">
               <a:buNone/>
-              <a:defRPr sz="1600"/>
+              <a:defRPr sz="2000"/>
             </a:lvl9pPr>
           </a:lstStyle>
           <a:p>
@@ -224,6 +251,47 @@
             <a:endParaRPr lang="en-US" dirty="0"/>
           </a:p>
         </p:txBody>
+      </p:sp>
+      <p:sp>
+        <p:nvSpPr>
+          <p:cNvPr id="7" name="Rectangle 6"/>
+          <p:cNvSpPr/>
+          <p:nvPr/>
+        </p:nvSpPr>
+        <p:spPr>
+          <a:xfrm>
+            <a:off x="0" y="0"/>
+            <a:ext cx="342900" cy="6858000"/>
+          </a:xfrm>
+          <a:prstGeom prst="rect">
+            <a:avLst/>
+          </a:prstGeom>
+          <a:solidFill>
+            <a:schemeClr val="bg2">
+              <a:lumMod val="60000"/>
+              <a:lumOff val="40000"/>
+            </a:schemeClr>
+          </a:solidFill>
+          <a:ln>
+            <a:noFill/>
+          </a:ln>
+        </p:spPr>
+        <p:style>
+          <a:lnRef idx="2">
+            <a:schemeClr val="accent1">
+              <a:shade val="50000"/>
+            </a:schemeClr>
+          </a:lnRef>
+          <a:fillRef idx="1">
+            <a:schemeClr val="accent1"/>
+          </a:fillRef>
+          <a:effectRef idx="0">
+            <a:schemeClr val="accent1"/>
+          </a:effectRef>
+          <a:fontRef idx="minor">
+            <a:schemeClr val="lt1"/>
+          </a:fontRef>
+        </p:style>
       </p:sp>
       <p:sp>
         <p:nvSpPr>
@@ -293,12 +361,12 @@
     </p:spTree>
     <p:extLst>
       <p:ext uri="{BB962C8B-B14F-4D97-AF65-F5344CB8AC3E}">
-        <p14:creationId xmlns:p14="http://schemas.microsoft.com/office/powerpoint/2010/main" val="664510737"/>
+        <p14:creationId xmlns:p14="http://schemas.microsoft.com/office/powerpoint/2010/main" val="3220480236"/>
       </p:ext>
     </p:extLst>
   </p:cSld>
   <p:clrMapOvr>
-    <a:masterClrMapping/>
+    <a:overrideClrMapping bg1="dk1" tx1="lt1" bg2="dk2" tx2="lt2" accent1="accent1" accent2="accent2" accent3="accent3" accent4="accent4" accent5="accent5" accent6="accent6" hlink="hlink" folHlink="folHlink"/>
   </p:clrMapOvr>
 </p:sldLayout>
 </file>
@@ -460,10 +528,51 @@
           </a:p>
         </p:txBody>
       </p:sp>
+      <p:sp>
+        <p:nvSpPr>
+          <p:cNvPr id="7" name="Rectangle 6"/>
+          <p:cNvSpPr/>
+          <p:nvPr/>
+        </p:nvSpPr>
+        <p:spPr>
+          <a:xfrm>
+            <a:off x="0" y="0"/>
+            <a:ext cx="342900" cy="6858000"/>
+          </a:xfrm>
+          <a:prstGeom prst="rect">
+            <a:avLst/>
+          </a:prstGeom>
+          <a:solidFill>
+            <a:schemeClr val="tx2">
+              <a:lumMod val="60000"/>
+              <a:lumOff val="40000"/>
+            </a:schemeClr>
+          </a:solidFill>
+          <a:ln>
+            <a:noFill/>
+          </a:ln>
+        </p:spPr>
+        <p:style>
+          <a:lnRef idx="2">
+            <a:schemeClr val="accent1">
+              <a:shade val="50000"/>
+            </a:schemeClr>
+          </a:lnRef>
+          <a:fillRef idx="1">
+            <a:schemeClr val="accent1"/>
+          </a:fillRef>
+          <a:effectRef idx="0">
+            <a:schemeClr val="accent1"/>
+          </a:effectRef>
+          <a:fontRef idx="minor">
+            <a:schemeClr val="lt1"/>
+          </a:fontRef>
+        </p:style>
+      </p:sp>
     </p:spTree>
     <p:extLst>
       <p:ext uri="{BB962C8B-B14F-4D97-AF65-F5344CB8AC3E}">
-        <p14:creationId xmlns:p14="http://schemas.microsoft.com/office/powerpoint/2010/main" val="3048994450"/>
+        <p14:creationId xmlns:p14="http://schemas.microsoft.com/office/powerpoint/2010/main" val="4022178248"/>
       </p:ext>
     </p:extLst>
   </p:cSld>
@@ -502,8 +611,8 @@
         </p:nvSpPr>
         <p:spPr>
           <a:xfrm>
-            <a:off x="6543675" y="365125"/>
-            <a:ext cx="1971675" cy="5811838"/>
+            <a:off x="6486525" y="381000"/>
+            <a:ext cx="1857375" cy="5897562"/>
           </a:xfrm>
         </p:spPr>
         <p:txBody>
@@ -530,8 +639,8 @@
         </p:nvSpPr>
         <p:spPr>
           <a:xfrm>
-            <a:off x="628650" y="365125"/>
-            <a:ext cx="5800725" cy="5811838"/>
+            <a:off x="571500" y="381000"/>
+            <a:ext cx="5800725" cy="5897562"/>
           </a:xfrm>
         </p:spPr>
         <p:txBody>
@@ -640,10 +749,51 @@
           </a:p>
         </p:txBody>
       </p:sp>
+      <p:sp>
+        <p:nvSpPr>
+          <p:cNvPr id="7" name="Rectangle 6"/>
+          <p:cNvSpPr/>
+          <p:nvPr/>
+        </p:nvSpPr>
+        <p:spPr>
+          <a:xfrm>
+            <a:off x="0" y="0"/>
+            <a:ext cx="342900" cy="6858000"/>
+          </a:xfrm>
+          <a:prstGeom prst="rect">
+            <a:avLst/>
+          </a:prstGeom>
+          <a:solidFill>
+            <a:schemeClr val="tx2">
+              <a:lumMod val="60000"/>
+              <a:lumOff val="40000"/>
+            </a:schemeClr>
+          </a:solidFill>
+          <a:ln>
+            <a:noFill/>
+          </a:ln>
+        </p:spPr>
+        <p:style>
+          <a:lnRef idx="2">
+            <a:schemeClr val="accent1">
+              <a:shade val="50000"/>
+            </a:schemeClr>
+          </a:lnRef>
+          <a:fillRef idx="1">
+            <a:schemeClr val="accent1"/>
+          </a:fillRef>
+          <a:effectRef idx="0">
+            <a:schemeClr val="accent1"/>
+          </a:effectRef>
+          <a:fontRef idx="minor">
+            <a:schemeClr val="lt1"/>
+          </a:fontRef>
+        </p:style>
+      </p:sp>
     </p:spTree>
     <p:extLst>
       <p:ext uri="{BB962C8B-B14F-4D97-AF65-F5344CB8AC3E}">
-        <p14:creationId xmlns:p14="http://schemas.microsoft.com/office/powerpoint/2010/main" val="1747935519"/>
+        <p14:creationId xmlns:p14="http://schemas.microsoft.com/office/powerpoint/2010/main" val="2011514529"/>
       </p:ext>
     </p:extLst>
   </p:cSld>
@@ -810,10 +960,51 @@
           </a:p>
         </p:txBody>
       </p:sp>
+      <p:sp>
+        <p:nvSpPr>
+          <p:cNvPr id="7" name="Rectangle 6"/>
+          <p:cNvSpPr/>
+          <p:nvPr/>
+        </p:nvSpPr>
+        <p:spPr>
+          <a:xfrm>
+            <a:off x="0" y="0"/>
+            <a:ext cx="342900" cy="6858000"/>
+          </a:xfrm>
+          <a:prstGeom prst="rect">
+            <a:avLst/>
+          </a:prstGeom>
+          <a:solidFill>
+            <a:schemeClr val="tx2">
+              <a:lumMod val="60000"/>
+              <a:lumOff val="40000"/>
+            </a:schemeClr>
+          </a:solidFill>
+          <a:ln>
+            <a:noFill/>
+          </a:ln>
+        </p:spPr>
+        <p:style>
+          <a:lnRef idx="2">
+            <a:schemeClr val="accent1">
+              <a:shade val="50000"/>
+            </a:schemeClr>
+          </a:lnRef>
+          <a:fillRef idx="1">
+            <a:schemeClr val="accent1"/>
+          </a:fillRef>
+          <a:effectRef idx="0">
+            <a:schemeClr val="accent1"/>
+          </a:effectRef>
+          <a:fontRef idx="minor">
+            <a:schemeClr val="lt1"/>
+          </a:fontRef>
+        </p:style>
+      </p:sp>
     </p:spTree>
     <p:extLst>
       <p:ext uri="{BB962C8B-B14F-4D97-AF65-F5344CB8AC3E}">
-        <p14:creationId xmlns:p14="http://schemas.microsoft.com/office/powerpoint/2010/main" val="2951645377"/>
+        <p14:creationId xmlns:p14="http://schemas.microsoft.com/office/powerpoint/2010/main" val="2172027301"/>
       </p:ext>
     </p:extLst>
   </p:cSld>
@@ -852,15 +1043,20 @@
         </p:nvSpPr>
         <p:spPr>
           <a:xfrm>
-            <a:off x="623888" y="1709739"/>
-            <a:ext cx="7886700" cy="2852737"/>
+            <a:off x="946404" y="758952"/>
+            <a:ext cx="7063740" cy="4041648"/>
           </a:xfrm>
         </p:spPr>
         <p:txBody>
-          <a:bodyPr anchor="b"/>
+          <a:bodyPr anchor="b">
+            <a:normAutofit/>
+          </a:bodyPr>
           <a:lstStyle>
             <a:lvl1pPr>
-              <a:defRPr sz="6000"/>
+              <a:lnSpc>
+                <a:spcPct val="85000"/>
+              </a:lnSpc>
+              <a:defRPr sz="6200" b="1" baseline="0"/>
             </a:lvl1pPr>
           </a:lstStyle>
           <a:p>
@@ -884,24 +1080,29 @@
         </p:nvSpPr>
         <p:spPr>
           <a:xfrm>
-            <a:off x="623888" y="4589464"/>
-            <a:ext cx="7886700" cy="1500187"/>
+            <a:off x="946404" y="4800600"/>
+            <a:ext cx="7063740" cy="1691640"/>
           </a:xfrm>
         </p:spPr>
         <p:txBody>
-          <a:bodyPr/>
+          <a:bodyPr anchor="t">
+            <a:normAutofit/>
+          </a:bodyPr>
           <a:lstStyle>
             <a:lvl1pPr marL="0" indent="0">
               <a:buNone/>
-              <a:defRPr sz="2400">
+              <a:defRPr sz="2000" spc="30" baseline="0">
                 <a:solidFill>
-                  <a:schemeClr val="tx1"/>
+                  <a:schemeClr val="tx1">
+                    <a:lumMod val="50000"/>
+                    <a:lumOff val="50000"/>
+                  </a:schemeClr>
                 </a:solidFill>
               </a:defRPr>
             </a:lvl1pPr>
             <a:lvl2pPr marL="457200" indent="0">
               <a:buNone/>
-              <a:defRPr sz="2000">
+              <a:defRPr sz="1800">
                 <a:solidFill>
                   <a:schemeClr val="tx1">
                     <a:tint val="75000"/>
@@ -911,7 +1112,7 @@
             </a:lvl2pPr>
             <a:lvl3pPr marL="914400" indent="0">
               <a:buNone/>
-              <a:defRPr sz="1800">
+              <a:defRPr sz="1600">
                 <a:solidFill>
                   <a:schemeClr val="tx1">
                     <a:tint val="75000"/>
@@ -921,7 +1122,7 @@
             </a:lvl3pPr>
             <a:lvl4pPr marL="1371600" indent="0">
               <a:buNone/>
-              <a:defRPr sz="1600">
+              <a:defRPr sz="1400">
                 <a:solidFill>
                   <a:schemeClr val="tx1">
                     <a:tint val="75000"/>
@@ -931,7 +1132,7 @@
             </a:lvl4pPr>
             <a:lvl5pPr marL="1828800" indent="0">
               <a:buNone/>
-              <a:defRPr sz="1600">
+              <a:defRPr sz="1400">
                 <a:solidFill>
                   <a:schemeClr val="tx1">
                     <a:tint val="75000"/>
@@ -941,7 +1142,7 @@
             </a:lvl5pPr>
             <a:lvl6pPr marL="2286000" indent="0">
               <a:buNone/>
-              <a:defRPr sz="1600">
+              <a:defRPr sz="1400">
                 <a:solidFill>
                   <a:schemeClr val="tx1">
                     <a:tint val="75000"/>
@@ -951,7 +1152,7 @@
             </a:lvl6pPr>
             <a:lvl7pPr marL="2743200" indent="0">
               <a:buNone/>
-              <a:defRPr sz="1600">
+              <a:defRPr sz="1400">
                 <a:solidFill>
                   <a:schemeClr val="tx1">
                     <a:tint val="75000"/>
@@ -961,7 +1162,7 @@
             </a:lvl7pPr>
             <a:lvl8pPr marL="3200400" indent="0">
               <a:buNone/>
-              <a:defRPr sz="1600">
+              <a:defRPr sz="1400">
                 <a:solidFill>
                   <a:schemeClr val="tx1">
                     <a:tint val="75000"/>
@@ -971,7 +1172,7 @@
             </a:lvl8pPr>
             <a:lvl9pPr marL="3657600" indent="0">
               <a:buNone/>
-              <a:defRPr sz="1600">
+              <a:defRPr sz="1400">
                 <a:solidFill>
                   <a:schemeClr val="tx1">
                     <a:tint val="75000"/>
@@ -1054,10 +1255,51 @@
           </a:p>
         </p:txBody>
       </p:sp>
+      <p:sp>
+        <p:nvSpPr>
+          <p:cNvPr id="7" name="Rectangle 6"/>
+          <p:cNvSpPr/>
+          <p:nvPr/>
+        </p:nvSpPr>
+        <p:spPr>
+          <a:xfrm>
+            <a:off x="0" y="0"/>
+            <a:ext cx="342900" cy="6858000"/>
+          </a:xfrm>
+          <a:prstGeom prst="rect">
+            <a:avLst/>
+          </a:prstGeom>
+          <a:solidFill>
+            <a:schemeClr val="tx2">
+              <a:lumMod val="60000"/>
+              <a:lumOff val="40000"/>
+            </a:schemeClr>
+          </a:solidFill>
+          <a:ln>
+            <a:noFill/>
+          </a:ln>
+        </p:spPr>
+        <p:style>
+          <a:lnRef idx="2">
+            <a:schemeClr val="accent1">
+              <a:shade val="50000"/>
+            </a:schemeClr>
+          </a:lnRef>
+          <a:fillRef idx="1">
+            <a:schemeClr val="accent1"/>
+          </a:fillRef>
+          <a:effectRef idx="0">
+            <a:schemeClr val="accent1"/>
+          </a:effectRef>
+          <a:fontRef idx="minor">
+            <a:schemeClr val="lt1"/>
+          </a:fontRef>
+        </p:style>
+      </p:sp>
     </p:spTree>
     <p:extLst>
       <p:ext uri="{BB962C8B-B14F-4D97-AF65-F5344CB8AC3E}">
-        <p14:creationId xmlns:p14="http://schemas.microsoft.com/office/powerpoint/2010/main" val="3911682368"/>
+        <p14:creationId xmlns:p14="http://schemas.microsoft.com/office/powerpoint/2010/main" val="1878664519"/>
       </p:ext>
     </p:extLst>
   </p:cSld>
@@ -1119,13 +1361,41 @@
         </p:nvSpPr>
         <p:spPr>
           <a:xfrm>
-            <a:off x="628650" y="1825625"/>
-            <a:ext cx="3886200" cy="4351338"/>
+            <a:off x="946404" y="1828801"/>
+            <a:ext cx="3360420" cy="4351337"/>
           </a:xfrm>
         </p:spPr>
         <p:txBody>
           <a:bodyPr/>
-          <a:lstStyle/>
+          <a:lstStyle>
+            <a:lvl1pPr>
+              <a:defRPr sz="2000"/>
+            </a:lvl1pPr>
+            <a:lvl2pPr>
+              <a:defRPr sz="1800"/>
+            </a:lvl2pPr>
+            <a:lvl3pPr>
+              <a:defRPr sz="1600"/>
+            </a:lvl3pPr>
+            <a:lvl4pPr>
+              <a:defRPr sz="1400"/>
+            </a:lvl4pPr>
+            <a:lvl5pPr>
+              <a:defRPr sz="1400"/>
+            </a:lvl5pPr>
+            <a:lvl6pPr>
+              <a:defRPr sz="1400"/>
+            </a:lvl6pPr>
+            <a:lvl7pPr>
+              <a:defRPr sz="1400"/>
+            </a:lvl7pPr>
+            <a:lvl8pPr>
+              <a:defRPr sz="1400"/>
+            </a:lvl8pPr>
+            <a:lvl9pPr>
+              <a:defRPr sz="1400"/>
+            </a:lvl9pPr>
+          </a:lstStyle>
           <a:p>
             <a:pPr lvl="0"/>
             <a:r>
@@ -1176,13 +1446,41 @@
         </p:nvSpPr>
         <p:spPr>
           <a:xfrm>
-            <a:off x="4629150" y="1825625"/>
-            <a:ext cx="3886200" cy="4351338"/>
+            <a:off x="4594860" y="1828801"/>
+            <a:ext cx="3360420" cy="4351337"/>
           </a:xfrm>
         </p:spPr>
         <p:txBody>
           <a:bodyPr/>
-          <a:lstStyle/>
+          <a:lstStyle>
+            <a:lvl1pPr>
+              <a:defRPr sz="2000"/>
+            </a:lvl1pPr>
+            <a:lvl2pPr>
+              <a:defRPr sz="1800"/>
+            </a:lvl2pPr>
+            <a:lvl3pPr>
+              <a:defRPr sz="1600"/>
+            </a:lvl3pPr>
+            <a:lvl4pPr>
+              <a:defRPr sz="1400"/>
+            </a:lvl4pPr>
+            <a:lvl5pPr>
+              <a:defRPr sz="1400"/>
+            </a:lvl5pPr>
+            <a:lvl6pPr>
+              <a:defRPr sz="1400"/>
+            </a:lvl6pPr>
+            <a:lvl7pPr>
+              <a:defRPr sz="1400"/>
+            </a:lvl7pPr>
+            <a:lvl8pPr>
+              <a:defRPr sz="1400"/>
+            </a:lvl8pPr>
+            <a:lvl9pPr>
+              <a:defRPr sz="1400"/>
+            </a:lvl9pPr>
+          </a:lstStyle>
           <a:p>
             <a:pPr lvl="0"/>
             <a:r>
@@ -1286,10 +1584,51 @@
           </a:p>
         </p:txBody>
       </p:sp>
+      <p:sp>
+        <p:nvSpPr>
+          <p:cNvPr id="8" name="Rectangle 7"/>
+          <p:cNvSpPr/>
+          <p:nvPr/>
+        </p:nvSpPr>
+        <p:spPr>
+          <a:xfrm>
+            <a:off x="0" y="0"/>
+            <a:ext cx="342900" cy="6858000"/>
+          </a:xfrm>
+          <a:prstGeom prst="rect">
+            <a:avLst/>
+          </a:prstGeom>
+          <a:solidFill>
+            <a:schemeClr val="tx2">
+              <a:lumMod val="60000"/>
+              <a:lumOff val="40000"/>
+            </a:schemeClr>
+          </a:solidFill>
+          <a:ln>
+            <a:noFill/>
+          </a:ln>
+        </p:spPr>
+        <p:style>
+          <a:lnRef idx="2">
+            <a:schemeClr val="accent1">
+              <a:shade val="50000"/>
+            </a:schemeClr>
+          </a:lnRef>
+          <a:fillRef idx="1">
+            <a:schemeClr val="accent1"/>
+          </a:fillRef>
+          <a:effectRef idx="0">
+            <a:schemeClr val="accent1"/>
+          </a:effectRef>
+          <a:fontRef idx="minor">
+            <a:schemeClr val="lt1"/>
+          </a:fontRef>
+        </p:style>
+      </p:sp>
     </p:spTree>
     <p:extLst>
       <p:ext uri="{BB962C8B-B14F-4D97-AF65-F5344CB8AC3E}">
-        <p14:creationId xmlns:p14="http://schemas.microsoft.com/office/powerpoint/2010/main" val="3376759232"/>
+        <p14:creationId xmlns:p14="http://schemas.microsoft.com/office/powerpoint/2010/main" val="648251757"/>
       </p:ext>
     </p:extLst>
   </p:cSld>
@@ -1318,54 +1657,58 @@
       </p:grpSpPr>
       <p:sp>
         <p:nvSpPr>
-          <p:cNvPr id="2" name="Title 1"/>
+          <p:cNvPr id="10" name="Title 9"/>
           <p:cNvSpPr>
             <a:spLocks noGrp="1"/>
           </p:cNvSpPr>
           <p:nvPr>
             <p:ph type="title"/>
+          </p:nvPr>
+        </p:nvSpPr>
+        <p:spPr/>
+        <p:txBody>
+          <a:bodyPr/>
+          <a:lstStyle/>
+          <a:p>
+            <a:r>
+              <a:rPr lang="de-DE"/>
+              <a:t>Titelmasterformat durch Klicken bearbeiten</a:t>
+            </a:r>
+            <a:endParaRPr lang="en-US" dirty="0"/>
+          </a:p>
+        </p:txBody>
+      </p:sp>
+      <p:sp>
+        <p:nvSpPr>
+          <p:cNvPr id="3" name="Text Placeholder 2"/>
+          <p:cNvSpPr>
+            <a:spLocks noGrp="1"/>
+          </p:cNvSpPr>
+          <p:nvPr>
+            <p:ph type="body" idx="1"/>
           </p:nvPr>
         </p:nvSpPr>
         <p:spPr>
           <a:xfrm>
-            <a:off x="629841" y="365126"/>
-            <a:ext cx="7886700" cy="1325563"/>
+            <a:off x="946404" y="1713655"/>
+            <a:ext cx="3360420" cy="731520"/>
           </a:xfrm>
         </p:spPr>
         <p:txBody>
-          <a:bodyPr/>
-          <a:lstStyle/>
-          <a:p>
-            <a:r>
-              <a:rPr lang="de-DE"/>
-              <a:t>Titelmasterformat durch Klicken bearbeiten</a:t>
-            </a:r>
-            <a:endParaRPr lang="en-US" dirty="0"/>
-          </a:p>
-        </p:txBody>
-      </p:sp>
-      <p:sp>
-        <p:nvSpPr>
-          <p:cNvPr id="3" name="Text Placeholder 2"/>
-          <p:cNvSpPr>
-            <a:spLocks noGrp="1"/>
-          </p:cNvSpPr>
-          <p:nvPr>
-            <p:ph type="body" idx="1"/>
-          </p:nvPr>
-        </p:nvSpPr>
-        <p:spPr>
-          <a:xfrm>
-            <a:off x="629842" y="1681163"/>
-            <a:ext cx="3868340" cy="823912"/>
-          </a:xfrm>
-        </p:spPr>
-        <p:txBody>
-          <a:bodyPr anchor="b"/>
+          <a:bodyPr anchor="b">
+            <a:normAutofit/>
+          </a:bodyPr>
           <a:lstStyle>
             <a:lvl1pPr marL="0" indent="0">
-              <a:buNone/>
-              <a:defRPr sz="2400" b="1"/>
+              <a:spcBef>
+                <a:spcPts val="0"/>
+              </a:spcBef>
+              <a:buNone/>
+              <a:defRPr sz="2000" b="0">
+                <a:solidFill>
+                  <a:schemeClr val="tx2"/>
+                </a:solidFill>
+              </a:defRPr>
             </a:lvl1pPr>
             <a:lvl2pPr marL="457200" indent="0">
               <a:buNone/>
@@ -1421,13 +1764,41 @@
         </p:nvSpPr>
         <p:spPr>
           <a:xfrm>
-            <a:off x="629842" y="2505075"/>
-            <a:ext cx="3868340" cy="3684588"/>
+            <a:off x="946404" y="2507550"/>
+            <a:ext cx="3360420" cy="3664650"/>
           </a:xfrm>
         </p:spPr>
         <p:txBody>
           <a:bodyPr/>
-          <a:lstStyle/>
+          <a:lstStyle>
+            <a:lvl1pPr>
+              <a:defRPr sz="1800"/>
+            </a:lvl1pPr>
+            <a:lvl2pPr>
+              <a:defRPr sz="1600"/>
+            </a:lvl2pPr>
+            <a:lvl3pPr>
+              <a:defRPr sz="1400"/>
+            </a:lvl3pPr>
+            <a:lvl4pPr>
+              <a:defRPr sz="1400"/>
+            </a:lvl4pPr>
+            <a:lvl5pPr>
+              <a:defRPr sz="1400"/>
+            </a:lvl5pPr>
+            <a:lvl6pPr>
+              <a:defRPr sz="1400"/>
+            </a:lvl6pPr>
+            <a:lvl7pPr>
+              <a:defRPr sz="1400"/>
+            </a:lvl7pPr>
+            <a:lvl8pPr>
+              <a:defRPr sz="1400"/>
+            </a:lvl8pPr>
+            <a:lvl9pPr>
+              <a:defRPr sz="1400"/>
+            </a:lvl9pPr>
+          </a:lstStyle>
           <a:p>
             <a:pPr lvl="0"/>
             <a:r>
@@ -1478,16 +1849,31 @@
         </p:nvSpPr>
         <p:spPr>
           <a:xfrm>
-            <a:off x="4629150" y="1681163"/>
-            <a:ext cx="3887391" cy="823912"/>
+            <a:off x="4594860" y="1713655"/>
+            <a:ext cx="3360420" cy="731520"/>
           </a:xfrm>
         </p:spPr>
         <p:txBody>
-          <a:bodyPr anchor="b"/>
+          <a:bodyPr anchor="b">
+            <a:normAutofit/>
+          </a:bodyPr>
           <a:lstStyle>
             <a:lvl1pPr marL="0" indent="0">
-              <a:buNone/>
-              <a:defRPr sz="2400" b="1"/>
+              <a:lnSpc>
+                <a:spcPct val="95000"/>
+              </a:lnSpc>
+              <a:spcBef>
+                <a:spcPts val="0"/>
+              </a:spcBef>
+              <a:buNone/>
+              <a:defRPr lang="en-US" sz="2000" b="0" kern="1200" dirty="0">
+                <a:solidFill>
+                  <a:schemeClr val="tx2"/>
+                </a:solidFill>
+                <a:latin typeface="+mn-lt"/>
+                <a:ea typeface="+mn-ea"/>
+                <a:cs typeface="+mn-cs"/>
+              </a:defRPr>
             </a:lvl1pPr>
             <a:lvl2pPr marL="457200" indent="0">
               <a:buNone/>
@@ -1523,7 +1909,16 @@
             </a:lvl9pPr>
           </a:lstStyle>
           <a:p>
-            <a:pPr lvl="0"/>
+            <a:pPr marL="0" lvl="0" indent="0" algn="l" defTabSz="914400" rtl="0" eaLnBrk="1" latinLnBrk="0" hangingPunct="1">
+              <a:lnSpc>
+                <a:spcPct val="90000"/>
+              </a:lnSpc>
+              <a:spcBef>
+                <a:spcPts val="2000"/>
+              </a:spcBef>
+              <a:buFontTx/>
+              <a:buNone/>
+            </a:pPr>
             <a:r>
               <a:rPr lang="de-DE"/>
               <a:t>Formatvorlagen des Textmasters bearbeiten</a:t>
@@ -1543,13 +1938,41 @@
         </p:nvSpPr>
         <p:spPr>
           <a:xfrm>
-            <a:off x="4629150" y="2505075"/>
-            <a:ext cx="3887391" cy="3684588"/>
+            <a:off x="4594860" y="2507550"/>
+            <a:ext cx="3360420" cy="3664650"/>
           </a:xfrm>
         </p:spPr>
         <p:txBody>
           <a:bodyPr/>
-          <a:lstStyle/>
+          <a:lstStyle>
+            <a:lvl1pPr>
+              <a:defRPr sz="1800"/>
+            </a:lvl1pPr>
+            <a:lvl2pPr>
+              <a:defRPr sz="1600"/>
+            </a:lvl2pPr>
+            <a:lvl3pPr>
+              <a:defRPr sz="1400"/>
+            </a:lvl3pPr>
+            <a:lvl4pPr>
+              <a:defRPr sz="1400"/>
+            </a:lvl4pPr>
+            <a:lvl5pPr>
+              <a:defRPr sz="1400"/>
+            </a:lvl5pPr>
+            <a:lvl6pPr>
+              <a:defRPr sz="1400"/>
+            </a:lvl6pPr>
+            <a:lvl7pPr>
+              <a:defRPr sz="1400"/>
+            </a:lvl7pPr>
+            <a:lvl8pPr>
+              <a:defRPr sz="1400"/>
+            </a:lvl8pPr>
+            <a:lvl9pPr>
+              <a:defRPr sz="1400"/>
+            </a:lvl9pPr>
+          </a:lstStyle>
           <a:p>
             <a:pPr lvl="0"/>
             <a:r>
@@ -1653,10 +2076,51 @@
           </a:p>
         </p:txBody>
       </p:sp>
+      <p:sp>
+        <p:nvSpPr>
+          <p:cNvPr id="11" name="Rectangle 10"/>
+          <p:cNvSpPr/>
+          <p:nvPr/>
+        </p:nvSpPr>
+        <p:spPr>
+          <a:xfrm>
+            <a:off x="0" y="0"/>
+            <a:ext cx="342900" cy="6858000"/>
+          </a:xfrm>
+          <a:prstGeom prst="rect">
+            <a:avLst/>
+          </a:prstGeom>
+          <a:solidFill>
+            <a:schemeClr val="tx2">
+              <a:lumMod val="60000"/>
+              <a:lumOff val="40000"/>
+            </a:schemeClr>
+          </a:solidFill>
+          <a:ln>
+            <a:noFill/>
+          </a:ln>
+        </p:spPr>
+        <p:style>
+          <a:lnRef idx="2">
+            <a:schemeClr val="accent1">
+              <a:shade val="50000"/>
+            </a:schemeClr>
+          </a:lnRef>
+          <a:fillRef idx="1">
+            <a:schemeClr val="accent1"/>
+          </a:fillRef>
+          <a:effectRef idx="0">
+            <a:schemeClr val="accent1"/>
+          </a:effectRef>
+          <a:fontRef idx="minor">
+            <a:schemeClr val="lt1"/>
+          </a:fontRef>
+        </p:style>
+      </p:sp>
     </p:spTree>
     <p:extLst>
       <p:ext uri="{BB962C8B-B14F-4D97-AF65-F5344CB8AC3E}">
-        <p14:creationId xmlns:p14="http://schemas.microsoft.com/office/powerpoint/2010/main" val="2226046117"/>
+        <p14:creationId xmlns:p14="http://schemas.microsoft.com/office/powerpoint/2010/main" val="3027714265"/>
       </p:ext>
     </p:extLst>
   </p:cSld>
@@ -1685,7 +2149,7 @@
       </p:grpSpPr>
       <p:sp>
         <p:nvSpPr>
-          <p:cNvPr id="2" name="Title 1"/>
+          <p:cNvPr id="6" name="Title 5"/>
           <p:cNvSpPr>
             <a:spLocks noGrp="1"/>
           </p:cNvSpPr>
@@ -1771,10 +2235,51 @@
           </a:p>
         </p:txBody>
       </p:sp>
+      <p:sp>
+        <p:nvSpPr>
+          <p:cNvPr id="7" name="Rectangle 6"/>
+          <p:cNvSpPr/>
+          <p:nvPr/>
+        </p:nvSpPr>
+        <p:spPr>
+          <a:xfrm>
+            <a:off x="0" y="0"/>
+            <a:ext cx="342900" cy="6858000"/>
+          </a:xfrm>
+          <a:prstGeom prst="rect">
+            <a:avLst/>
+          </a:prstGeom>
+          <a:solidFill>
+            <a:schemeClr val="tx2">
+              <a:lumMod val="60000"/>
+              <a:lumOff val="40000"/>
+            </a:schemeClr>
+          </a:solidFill>
+          <a:ln>
+            <a:noFill/>
+          </a:ln>
+        </p:spPr>
+        <p:style>
+          <a:lnRef idx="2">
+            <a:schemeClr val="accent1">
+              <a:shade val="50000"/>
+            </a:schemeClr>
+          </a:lnRef>
+          <a:fillRef idx="1">
+            <a:schemeClr val="accent1"/>
+          </a:fillRef>
+          <a:effectRef idx="0">
+            <a:schemeClr val="accent1"/>
+          </a:effectRef>
+          <a:fontRef idx="minor">
+            <a:schemeClr val="lt1"/>
+          </a:fontRef>
+        </p:style>
+      </p:sp>
     </p:spTree>
     <p:extLst>
       <p:ext uri="{BB962C8B-B14F-4D97-AF65-F5344CB8AC3E}">
-        <p14:creationId xmlns:p14="http://schemas.microsoft.com/office/powerpoint/2010/main" val="3556325970"/>
+        <p14:creationId xmlns:p14="http://schemas.microsoft.com/office/powerpoint/2010/main" val="2300606240"/>
       </p:ext>
     </p:extLst>
   </p:cSld>
@@ -1866,10 +2371,51 @@
           </a:p>
         </p:txBody>
       </p:sp>
+      <p:sp>
+        <p:nvSpPr>
+          <p:cNvPr id="5" name="Rectangle 4"/>
+          <p:cNvSpPr/>
+          <p:nvPr/>
+        </p:nvSpPr>
+        <p:spPr>
+          <a:xfrm>
+            <a:off x="0" y="0"/>
+            <a:ext cx="342900" cy="6858000"/>
+          </a:xfrm>
+          <a:prstGeom prst="rect">
+            <a:avLst/>
+          </a:prstGeom>
+          <a:solidFill>
+            <a:schemeClr val="tx2">
+              <a:lumMod val="60000"/>
+              <a:lumOff val="40000"/>
+            </a:schemeClr>
+          </a:solidFill>
+          <a:ln>
+            <a:noFill/>
+          </a:ln>
+        </p:spPr>
+        <p:style>
+          <a:lnRef idx="2">
+            <a:schemeClr val="accent1">
+              <a:shade val="50000"/>
+            </a:schemeClr>
+          </a:lnRef>
+          <a:fillRef idx="1">
+            <a:schemeClr val="accent1"/>
+          </a:fillRef>
+          <a:effectRef idx="0">
+            <a:schemeClr val="accent1"/>
+          </a:effectRef>
+          <a:fontRef idx="minor">
+            <a:schemeClr val="lt1"/>
+          </a:fontRef>
+        </p:style>
+      </p:sp>
     </p:spTree>
     <p:extLst>
       <p:ext uri="{BB962C8B-B14F-4D97-AF65-F5344CB8AC3E}">
-        <p14:creationId xmlns:p14="http://schemas.microsoft.com/office/powerpoint/2010/main" val="1669243075"/>
+        <p14:creationId xmlns:p14="http://schemas.microsoft.com/office/powerpoint/2010/main" val="3781309186"/>
       </p:ext>
     </p:extLst>
   </p:cSld>
@@ -1908,15 +2454,17 @@
         </p:nvSpPr>
         <p:spPr>
           <a:xfrm>
-            <a:off x="629841" y="457200"/>
-            <a:ext cx="2949178" cy="1600200"/>
+            <a:off x="630936" y="457201"/>
+            <a:ext cx="2400300" cy="1600197"/>
           </a:xfrm>
         </p:spPr>
         <p:txBody>
-          <a:bodyPr anchor="b"/>
+          <a:bodyPr anchor="b">
+            <a:normAutofit/>
+          </a:bodyPr>
           <a:lstStyle>
             <a:lvl1pPr>
-              <a:defRPr sz="3200"/>
+              <a:defRPr sz="2800" b="1" baseline="0"/>
             </a:lvl1pPr>
           </a:lstStyle>
           <a:p>
@@ -1940,39 +2488,39 @@
         </p:nvSpPr>
         <p:spPr>
           <a:xfrm>
-            <a:off x="3887391" y="987426"/>
-            <a:ext cx="4629150" cy="4873625"/>
+            <a:off x="3378200" y="685800"/>
+            <a:ext cx="4559300" cy="5486400"/>
           </a:xfrm>
         </p:spPr>
         <p:txBody>
           <a:bodyPr/>
           <a:lstStyle>
             <a:lvl1pPr>
-              <a:defRPr sz="3200"/>
+              <a:defRPr sz="1800"/>
             </a:lvl1pPr>
             <a:lvl2pPr>
-              <a:defRPr sz="2800"/>
+              <a:defRPr sz="1600"/>
             </a:lvl2pPr>
             <a:lvl3pPr>
-              <a:defRPr sz="2400"/>
+              <a:defRPr sz="1400"/>
             </a:lvl3pPr>
             <a:lvl4pPr>
-              <a:defRPr sz="2000"/>
+              <a:defRPr sz="1400"/>
             </a:lvl4pPr>
             <a:lvl5pPr>
-              <a:defRPr sz="2000"/>
+              <a:defRPr sz="1400"/>
             </a:lvl5pPr>
             <a:lvl6pPr>
-              <a:defRPr sz="2000"/>
+              <a:defRPr sz="1400"/>
             </a:lvl6pPr>
             <a:lvl7pPr>
-              <a:defRPr sz="2000"/>
+              <a:defRPr sz="1400"/>
             </a:lvl7pPr>
             <a:lvl8pPr>
-              <a:defRPr sz="2000"/>
+              <a:defRPr sz="1400"/>
             </a:lvl8pPr>
             <a:lvl9pPr>
-              <a:defRPr sz="2000"/>
+              <a:defRPr sz="1400"/>
             </a:lvl9pPr>
           </a:lstStyle>
           <a:p>
@@ -2025,48 +2573,56 @@
         </p:nvSpPr>
         <p:spPr>
           <a:xfrm>
-            <a:off x="629841" y="2057400"/>
-            <a:ext cx="2949178" cy="3811588"/>
+            <a:off x="630936" y="2099735"/>
+            <a:ext cx="2400300" cy="3810001"/>
           </a:xfrm>
         </p:spPr>
         <p:txBody>
-          <a:bodyPr/>
+          <a:bodyPr>
+            <a:normAutofit/>
+          </a:bodyPr>
           <a:lstStyle>
             <a:lvl1pPr marL="0" indent="0">
-              <a:buNone/>
-              <a:defRPr sz="1600"/>
+              <a:lnSpc>
+                <a:spcPct val="114000"/>
+              </a:lnSpc>
+              <a:spcBef>
+                <a:spcPts val="800"/>
+              </a:spcBef>
+              <a:buNone/>
+              <a:defRPr sz="1400"/>
             </a:lvl1pPr>
             <a:lvl2pPr marL="457200" indent="0">
               <a:buNone/>
-              <a:defRPr sz="1400"/>
+              <a:defRPr sz="1200"/>
             </a:lvl2pPr>
             <a:lvl3pPr marL="914400" indent="0">
               <a:buNone/>
-              <a:defRPr sz="1200"/>
+              <a:defRPr sz="1000"/>
             </a:lvl3pPr>
             <a:lvl4pPr marL="1371600" indent="0">
               <a:buNone/>
-              <a:defRPr sz="1000"/>
+              <a:defRPr sz="900"/>
             </a:lvl4pPr>
             <a:lvl5pPr marL="1828800" indent="0">
               <a:buNone/>
-              <a:defRPr sz="1000"/>
+              <a:defRPr sz="900"/>
             </a:lvl5pPr>
             <a:lvl6pPr marL="2286000" indent="0">
               <a:buNone/>
-              <a:defRPr sz="1000"/>
+              <a:defRPr sz="900"/>
             </a:lvl6pPr>
             <a:lvl7pPr marL="2743200" indent="0">
               <a:buNone/>
-              <a:defRPr sz="1000"/>
+              <a:defRPr sz="900"/>
             </a:lvl7pPr>
             <a:lvl8pPr marL="3200400" indent="0">
               <a:buNone/>
-              <a:defRPr sz="1000"/>
+              <a:defRPr sz="900"/>
             </a:lvl8pPr>
             <a:lvl9pPr marL="3657600" indent="0">
               <a:buNone/>
-              <a:defRPr sz="1000"/>
+              <a:defRPr sz="900"/>
             </a:lvl9pPr>
           </a:lstStyle>
           <a:p>
@@ -2146,7 +2702,7 @@
     </p:spTree>
     <p:extLst>
       <p:ext uri="{BB962C8B-B14F-4D97-AF65-F5344CB8AC3E}">
-        <p14:creationId xmlns:p14="http://schemas.microsoft.com/office/powerpoint/2010/main" val="906389911"/>
+        <p14:creationId xmlns:p14="http://schemas.microsoft.com/office/powerpoint/2010/main" val="1255592194"/>
       </p:ext>
     </p:extLst>
   </p:cSld>
@@ -2175,25 +2731,69 @@
       </p:grpSpPr>
       <p:sp>
         <p:nvSpPr>
-          <p:cNvPr id="2" name="Title 1"/>
-          <p:cNvSpPr>
-            <a:spLocks noGrp="1"/>
-          </p:cNvSpPr>
-          <p:nvPr>
-            <p:ph type="title"/>
-          </p:nvPr>
+          <p:cNvPr id="8" name="Rectangle 7"/>
+          <p:cNvSpPr/>
+          <p:nvPr/>
         </p:nvSpPr>
         <p:spPr>
           <a:xfrm>
-            <a:off x="629841" y="457200"/>
-            <a:ext cx="2949178" cy="1600200"/>
+            <a:off x="0" y="5105400"/>
+            <a:ext cx="8469630" cy="1752600"/>
+          </a:xfrm>
+          <a:prstGeom prst="rect">
+            <a:avLst/>
+          </a:prstGeom>
+          <a:solidFill>
+            <a:schemeClr val="tx2"/>
+          </a:solidFill>
+          <a:ln>
+            <a:noFill/>
+          </a:ln>
+        </p:spPr>
+        <p:style>
+          <a:lnRef idx="2">
+            <a:schemeClr val="accent1">
+              <a:shade val="50000"/>
+            </a:schemeClr>
+          </a:lnRef>
+          <a:fillRef idx="1">
+            <a:schemeClr val="accent1"/>
+          </a:fillRef>
+          <a:effectRef idx="0">
+            <a:schemeClr val="accent1"/>
+          </a:effectRef>
+          <a:fontRef idx="minor">
+            <a:schemeClr val="lt1"/>
+          </a:fontRef>
+        </p:style>
+      </p:sp>
+      <p:sp>
+        <p:nvSpPr>
+          <p:cNvPr id="2" name="Title 1"/>
+          <p:cNvSpPr>
+            <a:spLocks noGrp="1"/>
+          </p:cNvSpPr>
+          <p:nvPr>
+            <p:ph type="title"/>
+          </p:nvPr>
+        </p:nvSpPr>
+        <p:spPr>
+          <a:xfrm>
+            <a:off x="685800" y="5257800"/>
+            <a:ext cx="7486650" cy="914400"/>
           </a:xfrm>
         </p:spPr>
         <p:txBody>
-          <a:bodyPr anchor="b"/>
+          <a:bodyPr anchor="b">
+            <a:normAutofit/>
+          </a:bodyPr>
           <a:lstStyle>
             <a:lvl1pPr>
-              <a:defRPr sz="3200"/>
+              <a:defRPr sz="2800" b="1">
+                <a:solidFill>
+                  <a:schemeClr val="bg1"/>
+                </a:solidFill>
+              </a:defRPr>
             </a:lvl1pPr>
           </a:lstStyle>
           <a:p>
@@ -2217,8 +2817,8 @@
         </p:nvSpPr>
         <p:spPr>
           <a:xfrm>
-            <a:off x="3887391" y="987426"/>
-            <a:ext cx="4629150" cy="4873625"/>
+            <a:off x="0" y="1"/>
+            <a:ext cx="8469630" cy="5128923"/>
           </a:xfrm>
         </p:spPr>
         <p:txBody>
@@ -2282,48 +2882,62 @@
         </p:nvSpPr>
         <p:spPr>
           <a:xfrm>
-            <a:off x="629841" y="2057400"/>
-            <a:ext cx="2949178" cy="3811588"/>
+            <a:off x="685800" y="6108590"/>
+            <a:ext cx="7486650" cy="597011"/>
           </a:xfrm>
         </p:spPr>
         <p:txBody>
-          <a:bodyPr/>
+          <a:bodyPr>
+            <a:normAutofit/>
+          </a:bodyPr>
           <a:lstStyle>
             <a:lvl1pPr marL="0" indent="0">
-              <a:buNone/>
-              <a:defRPr sz="1600"/>
+              <a:lnSpc>
+                <a:spcPct val="100000"/>
+              </a:lnSpc>
+              <a:spcBef>
+                <a:spcPts val="800"/>
+              </a:spcBef>
+              <a:buNone/>
+              <a:defRPr sz="1400">
+                <a:solidFill>
+                  <a:schemeClr val="bg1">
+                    <a:lumMod val="75000"/>
+                  </a:schemeClr>
+                </a:solidFill>
+              </a:defRPr>
             </a:lvl1pPr>
             <a:lvl2pPr marL="457200" indent="0">
               <a:buNone/>
-              <a:defRPr sz="1400"/>
+              <a:defRPr sz="1200"/>
             </a:lvl2pPr>
             <a:lvl3pPr marL="914400" indent="0">
               <a:buNone/>
-              <a:defRPr sz="1200"/>
+              <a:defRPr sz="1000"/>
             </a:lvl3pPr>
             <a:lvl4pPr marL="1371600" indent="0">
               <a:buNone/>
-              <a:defRPr sz="1000"/>
+              <a:defRPr sz="900"/>
             </a:lvl4pPr>
             <a:lvl5pPr marL="1828800" indent="0">
               <a:buNone/>
-              <a:defRPr sz="1000"/>
+              <a:defRPr sz="900"/>
             </a:lvl5pPr>
             <a:lvl6pPr marL="2286000" indent="0">
               <a:buNone/>
-              <a:defRPr sz="1000"/>
+              <a:defRPr sz="900"/>
             </a:lvl6pPr>
             <a:lvl7pPr marL="2743200" indent="0">
               <a:buNone/>
-              <a:defRPr sz="1000"/>
+              <a:defRPr sz="900"/>
             </a:lvl7pPr>
             <a:lvl8pPr marL="3200400" indent="0">
               <a:buNone/>
-              <a:defRPr sz="1000"/>
+              <a:defRPr sz="900"/>
             </a:lvl8pPr>
             <a:lvl9pPr marL="3657600" indent="0">
               <a:buNone/>
-              <a:defRPr sz="1000"/>
+              <a:defRPr sz="900"/>
             </a:lvl9pPr>
           </a:lstStyle>
           <a:p>
@@ -2403,7 +3017,7 @@
     </p:spTree>
     <p:extLst>
       <p:ext uri="{BB962C8B-B14F-4D97-AF65-F5344CB8AC3E}">
-        <p14:creationId xmlns:p14="http://schemas.microsoft.com/office/powerpoint/2010/main" val="336832521"/>
+        <p14:creationId xmlns:p14="http://schemas.microsoft.com/office/powerpoint/2010/main" val="1847958139"/>
       </p:ext>
     </p:extLst>
   </p:cSld>
@@ -2437,25 +3051,63 @@
       </p:grpSpPr>
       <p:sp>
         <p:nvSpPr>
-          <p:cNvPr id="2" name="Title Placeholder 1"/>
-          <p:cNvSpPr>
-            <a:spLocks noGrp="1"/>
-          </p:cNvSpPr>
-          <p:nvPr>
-            <p:ph type="title"/>
-          </p:nvPr>
+          <p:cNvPr id="7" name="Rectangle 6"/>
+          <p:cNvSpPr/>
+          <p:nvPr/>
         </p:nvSpPr>
         <p:spPr>
           <a:xfrm>
-            <a:off x="628650" y="365126"/>
-            <a:ext cx="7886700" cy="1325563"/>
+            <a:off x="8418195" y="0"/>
+            <a:ext cx="731520" cy="6858000"/>
+          </a:xfrm>
+          <a:prstGeom prst="rect">
+            <a:avLst/>
+          </a:prstGeom>
+          <a:solidFill>
+            <a:schemeClr val="accent1"/>
+          </a:solidFill>
+          <a:ln>
+            <a:noFill/>
+          </a:ln>
+        </p:spPr>
+        <p:style>
+          <a:lnRef idx="2">
+            <a:schemeClr val="accent1">
+              <a:shade val="50000"/>
+            </a:schemeClr>
+          </a:lnRef>
+          <a:fillRef idx="1">
+            <a:schemeClr val="accent1"/>
+          </a:fillRef>
+          <a:effectRef idx="0">
+            <a:schemeClr val="accent1"/>
+          </a:effectRef>
+          <a:fontRef idx="minor">
+            <a:schemeClr val="lt1"/>
+          </a:fontRef>
+        </p:style>
+      </p:sp>
+      <p:sp>
+        <p:nvSpPr>
+          <p:cNvPr id="2" name="Title Placeholder 1"/>
+          <p:cNvSpPr>
+            <a:spLocks noGrp="1"/>
+          </p:cNvSpPr>
+          <p:nvPr>
+            <p:ph type="title"/>
+          </p:nvPr>
+        </p:nvSpPr>
+        <p:spPr>
+          <a:xfrm>
+            <a:off x="946404" y="365760"/>
+            <a:ext cx="7269480" cy="1325562"/>
           </a:xfrm>
           <a:prstGeom prst="rect">
             <a:avLst/>
           </a:prstGeom>
         </p:spPr>
         <p:txBody>
-          <a:bodyPr vert="horz" lIns="91440" tIns="45720" rIns="91440" bIns="45720" rtlCol="0" anchor="ctr">
+          <a:bodyPr vert="horz" lIns="91440" tIns="45720" rIns="91440" bIns="45720" rtlCol="0" anchor="b">
             <a:normAutofit/>
           </a:bodyPr>
           <a:lstStyle/>
@@ -2480,8 +3132,8 @@
         </p:nvSpPr>
         <p:spPr>
           <a:xfrm>
-            <a:off x="628650" y="1825625"/>
-            <a:ext cx="7886700" cy="4351338"/>
+            <a:off x="946404" y="1828801"/>
+            <a:ext cx="6446520" cy="4351337"/>
           </a:xfrm>
           <a:prstGeom prst="rect">
             <a:avLst/>
@@ -2541,9 +3193,9 @@
           </p:nvPr>
         </p:nvSpPr>
         <p:spPr>
-          <a:xfrm>
-            <a:off x="628650" y="6356351"/>
-            <a:ext cx="2057400" cy="365125"/>
+          <a:xfrm rot="16200000">
+            <a:off x="7831456" y="1044178"/>
+            <a:ext cx="1904999" cy="273844"/>
           </a:xfrm>
           <a:prstGeom prst="rect">
             <a:avLst/>
@@ -2552,11 +3204,12 @@
         <p:txBody>
           <a:bodyPr vert="horz" lIns="91440" tIns="45720" rIns="91440" bIns="45720" rtlCol="0" anchor="ctr"/>
           <a:lstStyle>
-            <a:lvl1pPr algn="l">
-              <a:defRPr sz="1200">
+            <a:lvl1pPr algn="r">
+              <a:defRPr sz="1050" b="0">
                 <a:solidFill>
-                  <a:schemeClr val="tx1">
-                    <a:tint val="75000"/>
+                  <a:schemeClr val="accent1">
+                    <a:lumMod val="40000"/>
+                    <a:lumOff val="60000"/>
                   </a:schemeClr>
                 </a:solidFill>
               </a:defRPr>
@@ -2582,9 +3235,9 @@
           </p:nvPr>
         </p:nvSpPr>
         <p:spPr>
-          <a:xfrm>
-            <a:off x="3028950" y="6356351"/>
-            <a:ext cx="3086100" cy="365125"/>
+          <a:xfrm rot="16200000">
+            <a:off x="6993255" y="4092178"/>
+            <a:ext cx="3581400" cy="273844"/>
           </a:xfrm>
           <a:prstGeom prst="rect">
             <a:avLst/>
@@ -2593,11 +3246,12 @@
         <p:txBody>
           <a:bodyPr vert="horz" lIns="91440" tIns="45720" rIns="91440" bIns="45720" rtlCol="0" anchor="ctr"/>
           <a:lstStyle>
-            <a:lvl1pPr algn="ctr">
-              <a:defRPr sz="1200">
+            <a:lvl1pPr algn="l">
+              <a:defRPr sz="1050">
                 <a:solidFill>
-                  <a:schemeClr val="tx1">
-                    <a:tint val="75000"/>
+                  <a:schemeClr val="accent1">
+                    <a:lumMod val="40000"/>
+                    <a:lumOff val="60000"/>
                   </a:schemeClr>
                 </a:solidFill>
               </a:defRPr>
@@ -2620,23 +3274,27 @@
         </p:nvSpPr>
         <p:spPr>
           <a:xfrm>
-            <a:off x="6457950" y="6356351"/>
-            <a:ext cx="2057400" cy="365125"/>
+            <a:off x="8441055" y="6172201"/>
+            <a:ext cx="685800" cy="593725"/>
           </a:xfrm>
           <a:prstGeom prst="rect">
             <a:avLst/>
           </a:prstGeom>
         </p:spPr>
         <p:txBody>
-          <a:bodyPr vert="horz" lIns="91440" tIns="45720" rIns="91440" bIns="45720" rtlCol="0" anchor="ctr"/>
+          <a:bodyPr vert="horz" lIns="27432" tIns="45720" rIns="27432" bIns="45720" rtlCol="0" anchor="ctr">
+            <a:normAutofit/>
+          </a:bodyPr>
           <a:lstStyle>
-            <a:lvl1pPr algn="r">
-              <a:defRPr sz="1200">
+            <a:lvl1pPr algn="ctr">
+              <a:defRPr sz="3200">
                 <a:solidFill>
-                  <a:schemeClr val="tx1">
-                    <a:tint val="75000"/>
+                  <a:schemeClr val="accent1">
+                    <a:lumMod val="60000"/>
+                    <a:lumOff val="40000"/>
                   </a:schemeClr>
                 </a:solidFill>
+                <a:latin typeface="+mj-lt"/>
               </a:defRPr>
             </a:lvl1pPr>
           </a:lstStyle>
@@ -2652,23 +3310,23 @@
     </p:spTree>
     <p:extLst>
       <p:ext uri="{BB962C8B-B14F-4D97-AF65-F5344CB8AC3E}">
-        <p14:creationId xmlns:p14="http://schemas.microsoft.com/office/powerpoint/2010/main" val="4266573336"/>
+        <p14:creationId xmlns:p14="http://schemas.microsoft.com/office/powerpoint/2010/main" val="1467539812"/>
       </p:ext>
     </p:extLst>
   </p:cSld>
   <p:clrMap bg1="lt1" tx1="dk1" bg2="lt2" tx2="dk2" accent1="accent1" accent2="accent2" accent3="accent3" accent4="accent4" accent5="accent5" accent6="accent6" hlink="hlink" folHlink="folHlink"/>
   <p:sldLayoutIdLst>
-    <p:sldLayoutId id="2147483661" r:id="rId1"/>
-    <p:sldLayoutId id="2147483662" r:id="rId2"/>
-    <p:sldLayoutId id="2147483663" r:id="rId3"/>
-    <p:sldLayoutId id="2147483664" r:id="rId4"/>
-    <p:sldLayoutId id="2147483665" r:id="rId5"/>
-    <p:sldLayoutId id="2147483666" r:id="rId6"/>
-    <p:sldLayoutId id="2147483667" r:id="rId7"/>
-    <p:sldLayoutId id="2147483668" r:id="rId8"/>
-    <p:sldLayoutId id="2147483669" r:id="rId9"/>
-    <p:sldLayoutId id="2147483670" r:id="rId10"/>
-    <p:sldLayoutId id="2147483671" r:id="rId11"/>
+    <p:sldLayoutId id="2147483721" r:id="rId1"/>
+    <p:sldLayoutId id="2147483722" r:id="rId2"/>
+    <p:sldLayoutId id="2147483723" r:id="rId3"/>
+    <p:sldLayoutId id="2147483724" r:id="rId4"/>
+    <p:sldLayoutId id="2147483725" r:id="rId5"/>
+    <p:sldLayoutId id="2147483726" r:id="rId6"/>
+    <p:sldLayoutId id="2147483727" r:id="rId7"/>
+    <p:sldLayoutId id="2147483728" r:id="rId8"/>
+    <p:sldLayoutId id="2147483729" r:id="rId9"/>
+    <p:sldLayoutId id="2147483730" r:id="rId10"/>
+    <p:sldLayoutId id="2147483731" r:id="rId11"/>
   </p:sldLayoutIdLst>
   <p:txStyles>
     <p:titleStyle>
@@ -2680,9 +3338,9 @@
           <a:spcPct val="0"/>
         </a:spcBef>
         <a:buNone/>
-        <a:defRPr sz="4400" kern="1200">
+        <a:defRPr sz="4000" b="1" kern="1200" spc="-70" baseline="0">
           <a:solidFill>
-            <a:schemeClr val="tx1"/>
+            <a:schemeClr val="accent1"/>
           </a:solidFill>
           <a:latin typeface="+mj-lt"/>
           <a:ea typeface="+mj-ea"/>
@@ -2691,162 +3349,244 @@
       </a:lvl1pPr>
     </p:titleStyle>
     <p:bodyStyle>
-      <a:lvl1pPr marL="228600" indent="-228600" algn="l" defTabSz="914400" rtl="0" eaLnBrk="1" latinLnBrk="0" hangingPunct="1">
+      <a:lvl1pPr marL="182880" indent="-182880" algn="l" defTabSz="914400" rtl="0" eaLnBrk="1" latinLnBrk="0" hangingPunct="1">
         <a:lnSpc>
-          <a:spcPct val="90000"/>
+          <a:spcPct val="95000"/>
         </a:lnSpc>
         <a:spcBef>
-          <a:spcPts val="1000"/>
+          <a:spcPts val="1400"/>
         </a:spcBef>
-        <a:buFont typeface="Arial" panose="020B0604020202020204" pitchFamily="34" charset="0"/>
+        <a:spcAft>
+          <a:spcPts val="200"/>
+        </a:spcAft>
+        <a:buClr>
+          <a:schemeClr val="accent1"/>
+        </a:buClr>
+        <a:buSzPct val="80000"/>
+        <a:buFont typeface="Arial" pitchFamily="34" charset="0"/>
         <a:buChar char="•"/>
-        <a:defRPr sz="2800" kern="1200">
+        <a:defRPr sz="2000" kern="1200" spc="10" baseline="0">
           <a:solidFill>
-            <a:schemeClr val="tx1"/>
+            <a:schemeClr val="tx1">
+              <a:lumMod val="65000"/>
+              <a:lumOff val="35000"/>
+            </a:schemeClr>
           </a:solidFill>
           <a:latin typeface="+mn-lt"/>
           <a:ea typeface="+mn-ea"/>
           <a:cs typeface="+mn-cs"/>
         </a:defRPr>
       </a:lvl1pPr>
-      <a:lvl2pPr marL="685800" indent="-228600" algn="l" defTabSz="914400" rtl="0" eaLnBrk="1" latinLnBrk="0" hangingPunct="1">
+      <a:lvl2pPr marL="457200" indent="-182880" algn="l" defTabSz="914400" rtl="0" eaLnBrk="1" latinLnBrk="0" hangingPunct="1">
         <a:lnSpc>
           <a:spcPct val="90000"/>
         </a:lnSpc>
         <a:spcBef>
-          <a:spcPts val="500"/>
+          <a:spcPts val="300"/>
         </a:spcBef>
-        <a:buFont typeface="Arial" panose="020B0604020202020204" pitchFamily="34" charset="0"/>
-        <a:buChar char="•"/>
-        <a:defRPr sz="2400" kern="1200">
+        <a:spcAft>
+          <a:spcPts val="300"/>
+        </a:spcAft>
+        <a:buClr>
+          <a:schemeClr val="accent1"/>
+        </a:buClr>
+        <a:buFont typeface="Wingdings 2" pitchFamily="18" charset="2"/>
+        <a:buChar char=""/>
+        <a:defRPr sz="1800" kern="1200">
           <a:solidFill>
-            <a:schemeClr val="tx1"/>
+            <a:schemeClr val="tx1">
+              <a:lumMod val="65000"/>
+              <a:lumOff val="35000"/>
+            </a:schemeClr>
           </a:solidFill>
           <a:latin typeface="+mn-lt"/>
           <a:ea typeface="+mn-ea"/>
           <a:cs typeface="+mn-cs"/>
         </a:defRPr>
       </a:lvl2pPr>
-      <a:lvl3pPr marL="1143000" indent="-228600" algn="l" defTabSz="914400" rtl="0" eaLnBrk="1" latinLnBrk="0" hangingPunct="1">
+      <a:lvl3pPr marL="731520" indent="-182880" algn="l" defTabSz="914400" rtl="0" eaLnBrk="1" latinLnBrk="0" hangingPunct="1">
         <a:lnSpc>
           <a:spcPct val="90000"/>
         </a:lnSpc>
         <a:spcBef>
-          <a:spcPts val="500"/>
+          <a:spcPts val="300"/>
         </a:spcBef>
-        <a:buFont typeface="Arial" panose="020B0604020202020204" pitchFamily="34" charset="0"/>
-        <a:buChar char="•"/>
-        <a:defRPr sz="2000" kern="1200">
+        <a:spcAft>
+          <a:spcPts val="300"/>
+        </a:spcAft>
+        <a:buClr>
+          <a:schemeClr val="accent1"/>
+        </a:buClr>
+        <a:buFont typeface="Wingdings 2" pitchFamily="18" charset="2"/>
+        <a:buChar char=""/>
+        <a:defRPr sz="1600" kern="1200">
           <a:solidFill>
-            <a:schemeClr val="tx1"/>
+            <a:schemeClr val="tx1">
+              <a:lumMod val="65000"/>
+              <a:lumOff val="35000"/>
+            </a:schemeClr>
           </a:solidFill>
           <a:latin typeface="+mn-lt"/>
           <a:ea typeface="+mn-ea"/>
           <a:cs typeface="+mn-cs"/>
         </a:defRPr>
       </a:lvl3pPr>
-      <a:lvl4pPr marL="1600200" indent="-228600" algn="l" defTabSz="914400" rtl="0" eaLnBrk="1" latinLnBrk="0" hangingPunct="1">
+      <a:lvl4pPr marL="1005840" indent="-182880" algn="l" defTabSz="914400" rtl="0" eaLnBrk="1" latinLnBrk="0" hangingPunct="1">
         <a:lnSpc>
           <a:spcPct val="90000"/>
         </a:lnSpc>
         <a:spcBef>
-          <a:spcPts val="500"/>
+          <a:spcPts val="300"/>
         </a:spcBef>
-        <a:buFont typeface="Arial" panose="020B0604020202020204" pitchFamily="34" charset="0"/>
-        <a:buChar char="•"/>
-        <a:defRPr sz="1800" kern="1200">
+        <a:spcAft>
+          <a:spcPts val="300"/>
+        </a:spcAft>
+        <a:buClr>
+          <a:schemeClr val="accent1"/>
+        </a:buClr>
+        <a:buFont typeface="Wingdings 2" pitchFamily="18" charset="2"/>
+        <a:buChar char=""/>
+        <a:defRPr sz="1400" kern="1200">
           <a:solidFill>
-            <a:schemeClr val="tx1"/>
+            <a:schemeClr val="tx1">
+              <a:lumMod val="65000"/>
+              <a:lumOff val="35000"/>
+            </a:schemeClr>
           </a:solidFill>
           <a:latin typeface="+mn-lt"/>
           <a:ea typeface="+mn-ea"/>
           <a:cs typeface="+mn-cs"/>
         </a:defRPr>
       </a:lvl4pPr>
-      <a:lvl5pPr marL="2057400" indent="-228600" algn="l" defTabSz="914400" rtl="0" eaLnBrk="1" latinLnBrk="0" hangingPunct="1">
+      <a:lvl5pPr marL="1280160" indent="-182880" algn="l" defTabSz="914400" rtl="0" eaLnBrk="1" latinLnBrk="0" hangingPunct="1">
         <a:lnSpc>
           <a:spcPct val="90000"/>
         </a:lnSpc>
         <a:spcBef>
-          <a:spcPts val="500"/>
+          <a:spcPts val="300"/>
         </a:spcBef>
-        <a:buFont typeface="Arial" panose="020B0604020202020204" pitchFamily="34" charset="0"/>
-        <a:buChar char="•"/>
-        <a:defRPr sz="1800" kern="1200">
+        <a:spcAft>
+          <a:spcPts val="300"/>
+        </a:spcAft>
+        <a:buClr>
+          <a:schemeClr val="accent1"/>
+        </a:buClr>
+        <a:buFont typeface="Wingdings 2" pitchFamily="18" charset="2"/>
+        <a:buChar char=""/>
+        <a:defRPr sz="1400" kern="1200">
           <a:solidFill>
-            <a:schemeClr val="tx1"/>
+            <a:schemeClr val="tx1">
+              <a:lumMod val="65000"/>
+              <a:lumOff val="35000"/>
+            </a:schemeClr>
           </a:solidFill>
           <a:latin typeface="+mn-lt"/>
           <a:ea typeface="+mn-ea"/>
           <a:cs typeface="+mn-cs"/>
         </a:defRPr>
       </a:lvl5pPr>
-      <a:lvl6pPr marL="2514600" indent="-228600" algn="l" defTabSz="914400" rtl="0" eaLnBrk="1" latinLnBrk="0" hangingPunct="1">
+      <a:lvl6pPr marL="1600000" indent="-228600" algn="l" defTabSz="914400" rtl="0" eaLnBrk="1" latinLnBrk="0" hangingPunct="1">
         <a:lnSpc>
           <a:spcPct val="90000"/>
         </a:lnSpc>
         <a:spcBef>
-          <a:spcPts val="500"/>
+          <a:spcPts val="300"/>
         </a:spcBef>
-        <a:buFont typeface="Arial" panose="020B0604020202020204" pitchFamily="34" charset="0"/>
-        <a:buChar char="•"/>
-        <a:defRPr sz="1800" kern="1200">
+        <a:spcAft>
+          <a:spcPts val="300"/>
+        </a:spcAft>
+        <a:buClr>
+          <a:schemeClr val="accent1"/>
+        </a:buClr>
+        <a:buFont typeface="Wingdings 2" pitchFamily="18" charset="2"/>
+        <a:buChar char=""/>
+        <a:defRPr sz="1400" kern="1200">
           <a:solidFill>
-            <a:schemeClr val="tx1"/>
+            <a:schemeClr val="tx1">
+              <a:lumMod val="65000"/>
+              <a:lumOff val="35000"/>
+            </a:schemeClr>
           </a:solidFill>
           <a:latin typeface="+mn-lt"/>
           <a:ea typeface="+mn-ea"/>
           <a:cs typeface="+mn-cs"/>
         </a:defRPr>
       </a:lvl6pPr>
-      <a:lvl7pPr marL="2971800" indent="-228600" algn="l" defTabSz="914400" rtl="0" eaLnBrk="1" latinLnBrk="0" hangingPunct="1">
+      <a:lvl7pPr marL="1900000" indent="-228600" algn="l" defTabSz="914400" rtl="0" eaLnBrk="1" latinLnBrk="0" hangingPunct="1">
         <a:lnSpc>
           <a:spcPct val="90000"/>
         </a:lnSpc>
         <a:spcBef>
-          <a:spcPts val="500"/>
+          <a:spcPts val="300"/>
         </a:spcBef>
-        <a:buFont typeface="Arial" panose="020B0604020202020204" pitchFamily="34" charset="0"/>
-        <a:buChar char="•"/>
-        <a:defRPr sz="1800" kern="1200">
+        <a:spcAft>
+          <a:spcPts val="300"/>
+        </a:spcAft>
+        <a:buClr>
+          <a:schemeClr val="accent1"/>
+        </a:buClr>
+        <a:buFont typeface="Wingdings 2" pitchFamily="18" charset="2"/>
+        <a:buChar char=""/>
+        <a:defRPr sz="1400" kern="1200">
           <a:solidFill>
-            <a:schemeClr val="tx1"/>
+            <a:schemeClr val="tx1">
+              <a:lumMod val="65000"/>
+              <a:lumOff val="35000"/>
+            </a:schemeClr>
           </a:solidFill>
           <a:latin typeface="+mn-lt"/>
           <a:ea typeface="+mn-ea"/>
           <a:cs typeface="+mn-cs"/>
         </a:defRPr>
       </a:lvl7pPr>
-      <a:lvl8pPr marL="3429000" indent="-228600" algn="l" defTabSz="914400" rtl="0" eaLnBrk="1" latinLnBrk="0" hangingPunct="1">
+      <a:lvl8pPr marL="2200000" indent="-228600" algn="l" defTabSz="914400" rtl="0" eaLnBrk="1" latinLnBrk="0" hangingPunct="1">
         <a:lnSpc>
           <a:spcPct val="90000"/>
         </a:lnSpc>
         <a:spcBef>
-          <a:spcPts val="500"/>
+          <a:spcPts val="300"/>
         </a:spcBef>
-        <a:buFont typeface="Arial" panose="020B0604020202020204" pitchFamily="34" charset="0"/>
-        <a:buChar char="•"/>
-        <a:defRPr sz="1800" kern="1200">
+        <a:spcAft>
+          <a:spcPts val="300"/>
+        </a:spcAft>
+        <a:buClr>
+          <a:schemeClr val="accent1"/>
+        </a:buClr>
+        <a:buFont typeface="Wingdings 2" pitchFamily="18" charset="2"/>
+        <a:buChar char=""/>
+        <a:defRPr sz="1400" kern="1200">
           <a:solidFill>
-            <a:schemeClr val="tx1"/>
+            <a:schemeClr val="tx1">
+              <a:lumMod val="65000"/>
+              <a:lumOff val="35000"/>
+            </a:schemeClr>
           </a:solidFill>
           <a:latin typeface="+mn-lt"/>
           <a:ea typeface="+mn-ea"/>
           <a:cs typeface="+mn-cs"/>
         </a:defRPr>
       </a:lvl8pPr>
-      <a:lvl9pPr marL="3886200" indent="-228600" algn="l" defTabSz="914400" rtl="0" eaLnBrk="1" latinLnBrk="0" hangingPunct="1">
+      <a:lvl9pPr marL="2500000" indent="-228600" algn="l" defTabSz="914400" rtl="0" eaLnBrk="1" latinLnBrk="0" hangingPunct="1">
         <a:lnSpc>
           <a:spcPct val="90000"/>
         </a:lnSpc>
         <a:spcBef>
-          <a:spcPts val="500"/>
+          <a:spcPts val="300"/>
         </a:spcBef>
-        <a:buFont typeface="Arial" panose="020B0604020202020204" pitchFamily="34" charset="0"/>
-        <a:buChar char="•"/>
-        <a:defRPr sz="1800" kern="1200">
+        <a:spcAft>
+          <a:spcPts val="300"/>
+        </a:spcAft>
+        <a:buClr>
+          <a:schemeClr val="accent1"/>
+        </a:buClr>
+        <a:buFont typeface="Wingdings 2" pitchFamily="18" charset="2"/>
+        <a:buChar char=""/>
+        <a:defRPr sz="1400" kern="1200">
           <a:solidFill>
-            <a:schemeClr val="tx1"/>
+            <a:schemeClr val="tx1">
+              <a:lumMod val="65000"/>
+              <a:lumOff val="35000"/>
+            </a:schemeClr>
           </a:solidFill>
           <a:latin typeface="+mn-lt"/>
           <a:ea typeface="+mn-ea"/>
@@ -3022,8 +3762,11 @@
           </a:bodyPr>
           <a:lstStyle/>
           <a:p>
-            <a:r>
-              <a:rPr lang="de-AT" dirty="0" err="1"/>
+            <a:endParaRPr lang="de-AT"/>
+          </a:p>
+          <a:p>
+            <a:r>
+              <a:rPr lang="de-AT"/>
               <a:t>Superflux</a:t>
             </a:r>
             <a:r>
@@ -3159,15 +3902,7 @@
             </a:r>
             <a:r>
               <a:rPr lang="de-AT" dirty="0"/>
-              <a:t> ≈ </a:t>
-            </a:r>
-            <a:r>
-              <a:rPr lang="de-AT" dirty="0">
-                <a:solidFill>
-                  <a:srgbClr val="FF0000"/>
-                </a:solidFill>
-              </a:rPr>
-              <a:t>75 %</a:t>
+              <a:t> ≈ 75 %</a:t>
             </a:r>
           </a:p>
           <a:p>
@@ -3194,9 +3929,9 @@
 </file>
 
 <file path=ppt/theme/theme1.xml><?xml version="1.0" encoding="utf-8"?>
-<a:theme xmlns:a="http://schemas.openxmlformats.org/drawingml/2006/main" name="Office">
+<a:theme xmlns:a="http://schemas.openxmlformats.org/drawingml/2006/main" name="View">
   <a:themeElements>
-    <a:clrScheme name="Office">
+    <a:clrScheme name="View">
       <a:dk1>
         <a:sysClr val="windowText" lastClr="000000"/>
       </a:dk1>
@@ -3204,83 +3939,48 @@
         <a:sysClr val="window" lastClr="FFFFFF"/>
       </a:lt1>
       <a:dk2>
-        <a:srgbClr val="44546A"/>
+        <a:srgbClr val="696464"/>
       </a:dk2>
       <a:lt2>
-        <a:srgbClr val="E7E6E6"/>
+        <a:srgbClr val="E9E5DC"/>
       </a:lt2>
       <a:accent1>
-        <a:srgbClr val="4472C4"/>
+        <a:srgbClr val="D34817"/>
       </a:accent1>
       <a:accent2>
-        <a:srgbClr val="ED7D31"/>
+        <a:srgbClr val="9B2D1F"/>
       </a:accent2>
       <a:accent3>
-        <a:srgbClr val="A5A5A5"/>
+        <a:srgbClr val="A28E6A"/>
       </a:accent3>
       <a:accent4>
-        <a:srgbClr val="FFC000"/>
+        <a:srgbClr val="956251"/>
       </a:accent4>
       <a:accent5>
-        <a:srgbClr val="5B9BD5"/>
+        <a:srgbClr val="918485"/>
       </a:accent5>
       <a:accent6>
-        <a:srgbClr val="70AD47"/>
+        <a:srgbClr val="855D5D"/>
       </a:accent6>
       <a:hlink>
-        <a:srgbClr val="0563C1"/>
+        <a:srgbClr val="CC9900"/>
       </a:hlink>
       <a:folHlink>
-        <a:srgbClr val="954F72"/>
+        <a:srgbClr val="96A9A9"/>
       </a:folHlink>
     </a:clrScheme>
-    <a:fontScheme name="Office">
+    <a:fontScheme name="View">
       <a:majorFont>
-        <a:latin typeface="Calibri Light" panose="020F0302020204030204"/>
+        <a:latin typeface="Century Schoolbook" panose="02040604050505020304"/>
         <a:ea typeface=""/>
         <a:cs typeface=""/>
-        <a:font script="Jpan" typeface="游ゴシック Light"/>
+        <a:font script="Jpan" typeface="ＭＳ ゴシック"/>
         <a:font script="Hang" typeface="맑은 고딕"/>
-        <a:font script="Hans" typeface="等线 Light"/>
+        <a:font script="Hans" typeface="宋体"/>
         <a:font script="Hant" typeface="新細明體"/>
-        <a:font script="Arab" typeface="Times New Roman"/>
-        <a:font script="Hebr" typeface="Times New Roman"/>
-        <a:font script="Thai" typeface="Angsana New"/>
-        <a:font script="Ethi" typeface="Nyala"/>
-        <a:font script="Beng" typeface="Vrinda"/>
-        <a:font script="Gujr" typeface="Shruti"/>
-        <a:font script="Khmr" typeface="MoolBoran"/>
-        <a:font script="Knda" typeface="Tunga"/>
-        <a:font script="Guru" typeface="Raavi"/>
-        <a:font script="Cans" typeface="Euphemia"/>
-        <a:font script="Cher" typeface="Plantagenet Cherokee"/>
-        <a:font script="Yiii" typeface="Microsoft Yi Baiti"/>
-        <a:font script="Tibt" typeface="Microsoft Himalaya"/>
-        <a:font script="Thaa" typeface="MV Boli"/>
-        <a:font script="Deva" typeface="Mangal"/>
-        <a:font script="Telu" typeface="Gautami"/>
-        <a:font script="Taml" typeface="Latha"/>
-        <a:font script="Syrc" typeface="Estrangelo Edessa"/>
-        <a:font script="Orya" typeface="Kalinga"/>
-        <a:font script="Mlym" typeface="Kartika"/>
-        <a:font script="Laoo" typeface="DokChampa"/>
-        <a:font script="Sinh" typeface="Iskoola Pota"/>
-        <a:font script="Mong" typeface="Mongolian Baiti"/>
-        <a:font script="Viet" typeface="Times New Roman"/>
-        <a:font script="Uigh" typeface="Microsoft Uighur"/>
-        <a:font script="Geor" typeface="Sylfaen"/>
-      </a:majorFont>
-      <a:minorFont>
-        <a:latin typeface="Calibri" panose="020F0502020204030204"/>
-        <a:ea typeface=""/>
-        <a:cs typeface=""/>
-        <a:font script="Jpan" typeface="游ゴシック"/>
-        <a:font script="Hang" typeface="맑은 고딕"/>
-        <a:font script="Hans" typeface="等线"/>
-        <a:font script="Hant" typeface="新細明體"/>
-        <a:font script="Arab" typeface="Arial"/>
-        <a:font script="Hebr" typeface="Arial"/>
-        <a:font script="Thai" typeface="Cordia New"/>
+        <a:font script="Arab" typeface="Tahoma"/>
+        <a:font script="Hebr" typeface="Gisha"/>
+        <a:font script="Thai" typeface="DilleniaUPC"/>
         <a:font script="Ethi" typeface="Nyala"/>
         <a:font script="Beng" typeface="Vrinda"/>
         <a:font script="Gujr" typeface="Shruti"/>
@@ -3301,90 +4001,86 @@
         <a:font script="Laoo" typeface="DokChampa"/>
         <a:font script="Sinh" typeface="Iskoola Pota"/>
         <a:font script="Mong" typeface="Mongolian Baiti"/>
-        <a:font script="Viet" typeface="Arial"/>
+        <a:font script="Viet" typeface="Tahoma"/>
+        <a:font script="Uigh" typeface="Microsoft Uighur"/>
+        <a:font script="Geor" typeface="Sylfaen"/>
+      </a:majorFont>
+      <a:minorFont>
+        <a:latin typeface="Century Schoolbook" panose="02040604050505020304"/>
+        <a:ea typeface=""/>
+        <a:cs typeface=""/>
+        <a:font script="Jpan" typeface="ＭＳ ゴシック"/>
+        <a:font script="Hang" typeface="맑은 고딕"/>
+        <a:font script="Hans" typeface="宋体"/>
+        <a:font script="Hant" typeface="新細明體"/>
+        <a:font script="Arab" typeface="Tahoma"/>
+        <a:font script="Hebr" typeface="Gisha"/>
+        <a:font script="Thai" typeface="DilleniaUPC"/>
+        <a:font script="Ethi" typeface="Nyala"/>
+        <a:font script="Beng" typeface="Vrinda"/>
+        <a:font script="Gujr" typeface="Shruti"/>
+        <a:font script="Khmr" typeface="DaunPenh"/>
+        <a:font script="Knda" typeface="Tunga"/>
+        <a:font script="Guru" typeface="Raavi"/>
+        <a:font script="Cans" typeface="Euphemia"/>
+        <a:font script="Cher" typeface="Plantagenet Cherokee"/>
+        <a:font script="Yiii" typeface="Microsoft Yi Baiti"/>
+        <a:font script="Tibt" typeface="Microsoft Himalaya"/>
+        <a:font script="Thaa" typeface="MV Boli"/>
+        <a:font script="Deva" typeface="Mangal"/>
+        <a:font script="Telu" typeface="Gautami"/>
+        <a:font script="Taml" typeface="Latha"/>
+        <a:font script="Syrc" typeface="Estrangelo Edessa"/>
+        <a:font script="Orya" typeface="Kalinga"/>
+        <a:font script="Mlym" typeface="Kartika"/>
+        <a:font script="Laoo" typeface="DokChampa"/>
+        <a:font script="Sinh" typeface="Iskoola Pota"/>
+        <a:font script="Mong" typeface="Mongolian Baiti"/>
+        <a:font script="Viet" typeface="Verdana"/>
         <a:font script="Uigh" typeface="Microsoft Uighur"/>
         <a:font script="Geor" typeface="Sylfaen"/>
       </a:minorFont>
     </a:fontScheme>
-    <a:fmtScheme name="Office">
+    <a:fmtScheme name="View">
       <a:fillStyleLst>
         <a:solidFill>
           <a:schemeClr val="phClr"/>
         </a:solidFill>
-        <a:gradFill rotWithShape="1">
-          <a:gsLst>
-            <a:gs pos="0">
-              <a:schemeClr val="phClr">
-                <a:lumMod val="110000"/>
-                <a:satMod val="105000"/>
-                <a:tint val="67000"/>
-              </a:schemeClr>
-            </a:gs>
-            <a:gs pos="50000">
-              <a:schemeClr val="phClr">
-                <a:lumMod val="105000"/>
-                <a:satMod val="103000"/>
-                <a:tint val="73000"/>
-              </a:schemeClr>
-            </a:gs>
-            <a:gs pos="100000">
-              <a:schemeClr val="phClr">
-                <a:lumMod val="105000"/>
-                <a:satMod val="109000"/>
-                <a:tint val="81000"/>
-              </a:schemeClr>
-            </a:gs>
-          </a:gsLst>
-          <a:lin ang="5400000" scaled="0"/>
-        </a:gradFill>
-        <a:gradFill rotWithShape="1">
-          <a:gsLst>
-            <a:gs pos="0">
-              <a:schemeClr val="phClr">
-                <a:satMod val="103000"/>
-                <a:lumMod val="102000"/>
-                <a:tint val="94000"/>
-              </a:schemeClr>
-            </a:gs>
-            <a:gs pos="50000">
-              <a:schemeClr val="phClr">
-                <a:satMod val="110000"/>
-                <a:lumMod val="100000"/>
-                <a:shade val="100000"/>
-              </a:schemeClr>
-            </a:gs>
-            <a:gs pos="100000">
-              <a:schemeClr val="phClr">
-                <a:lumMod val="99000"/>
-                <a:satMod val="120000"/>
-                <a:shade val="78000"/>
-              </a:schemeClr>
-            </a:gs>
-          </a:gsLst>
-          <a:lin ang="5400000" scaled="0"/>
-        </a:gradFill>
+        <a:solidFill>
+          <a:schemeClr val="phClr">
+            <a:tint val="60000"/>
+            <a:satMod val="120000"/>
+          </a:schemeClr>
+        </a:solidFill>
+        <a:solidFill>
+          <a:schemeClr val="phClr">
+            <a:shade val="75000"/>
+            <a:satMod val="130000"/>
+          </a:schemeClr>
+        </a:solidFill>
       </a:fillStyleLst>
       <a:lnStyleLst>
-        <a:ln w="6350" cap="flat" cmpd="sng" algn="ctr">
+        <a:ln w="9525" cap="flat" cmpd="sng" algn="ctr">
           <a:solidFill>
             <a:schemeClr val="phClr"/>
           </a:solidFill>
           <a:prstDash val="solid"/>
-          <a:miter lim="800000"/>
         </a:ln>
-        <a:ln w="12700" cap="flat" cmpd="sng" algn="ctr">
+        <a:ln w="13970" cap="flat" cmpd="sng" algn="ctr">
           <a:solidFill>
             <a:schemeClr val="phClr"/>
           </a:solidFill>
           <a:prstDash val="solid"/>
-          <a:miter lim="800000"/>
         </a:ln>
-        <a:ln w="19050" cap="flat" cmpd="sng" algn="ctr">
+        <a:ln w="17145" cap="flat" cmpd="sng" algn="ctr">
           <a:solidFill>
-            <a:schemeClr val="phClr"/>
+            <a:schemeClr val="phClr">
+              <a:shade val="95000"/>
+              <a:alpha val="95000"/>
+              <a:satMod val="150000"/>
+            </a:schemeClr>
           </a:solidFill>
           <a:prstDash val="solid"/>
-          <a:miter lim="800000"/>
         </a:ln>
       </a:lnStyleLst>
       <a:effectStyleLst>
@@ -3392,16 +4088,52 @@
           <a:effectLst/>
         </a:effectStyle>
         <a:effectStyle>
-          <a:effectLst/>
+          <a:effectLst>
+            <a:outerShdw blurRad="50800" dist="15240" dir="5400000" algn="tl" rotWithShape="0">
+              <a:srgbClr val="000000">
+                <a:alpha val="75000"/>
+              </a:srgbClr>
+            </a:outerShdw>
+          </a:effectLst>
+          <a:scene3d>
+            <a:camera prst="orthographicFront">
+              <a:rot lat="0" lon="0" rev="0"/>
+            </a:camera>
+            <a:lightRig rig="brightRoom" dir="tl"/>
+          </a:scene3d>
+          <a:sp3d contourW="9525" prstMaterial="flat">
+            <a:bevelT w="0" h="0" prst="coolSlant"/>
+            <a:contourClr>
+              <a:schemeClr val="phClr">
+                <a:shade val="35000"/>
+                <a:satMod val="130000"/>
+              </a:schemeClr>
+            </a:contourClr>
+          </a:sp3d>
         </a:effectStyle>
         <a:effectStyle>
           <a:effectLst>
-            <a:outerShdw blurRad="57150" dist="19050" dir="5400000" algn="ctr" rotWithShape="0">
+            <a:outerShdw blurRad="76200" dist="25400" dir="5400000" algn="tl" rotWithShape="0">
               <a:srgbClr val="000000">
-                <a:alpha val="63000"/>
+                <a:alpha val="55000"/>
               </a:srgbClr>
             </a:outerShdw>
           </a:effectLst>
+          <a:scene3d>
+            <a:camera prst="orthographicFront">
+              <a:rot lat="0" lon="0" rev="0"/>
+            </a:camera>
+            <a:lightRig rig="brightRoom" dir="tl"/>
+          </a:scene3d>
+          <a:sp3d contourW="19050" prstMaterial="flat">
+            <a:bevelT w="0" h="0" prst="coolSlant"/>
+            <a:contourClr>
+              <a:schemeClr val="phClr">
+                <a:shade val="25000"/>
+                <a:satMod val="140000"/>
+              </a:schemeClr>
+            </a:contourClr>
+          </a:sp3d>
         </a:effectStyle>
       </a:effectStyleLst>
       <a:bgFillStyleLst>
@@ -3418,28 +4150,23 @@
           <a:gsLst>
             <a:gs pos="0">
               <a:schemeClr val="phClr">
-                <a:tint val="93000"/>
-                <a:satMod val="150000"/>
+                <a:tint val="94000"/>
                 <a:shade val="98000"/>
+                <a:satMod val="130000"/>
                 <a:lumMod val="102000"/>
-              </a:schemeClr>
-            </a:gs>
-            <a:gs pos="50000">
-              <a:schemeClr val="phClr">
-                <a:tint val="98000"/>
-                <a:satMod val="130000"/>
-                <a:shade val="90000"/>
-                <a:lumMod val="103000"/>
               </a:schemeClr>
             </a:gs>
             <a:gs pos="100000">
               <a:schemeClr val="phClr">
-                <a:shade val="63000"/>
-                <a:satMod val="120000"/>
+                <a:tint val="98000"/>
+                <a:shade val="78000"/>
+                <a:satMod val="140000"/>
               </a:schemeClr>
             </a:gs>
           </a:gsLst>
-          <a:lin ang="5400000" scaled="0"/>
+          <a:path path="circle">
+            <a:fillToRect l="100000" t="100000" r="100000" b="100000"/>
+          </a:path>
         </a:gradFill>
       </a:bgFillStyleLst>
     </a:fmtScheme>
@@ -3448,7 +4175,7 @@
   <a:extraClrSchemeLst/>
   <a:extLst>
     <a:ext uri="{05A4C25C-085E-4340-85A3-A5531E510DB2}">
-      <thm15:themeFamily xmlns:thm15="http://schemas.microsoft.com/office/thememl/2012/main" name="Office Theme" id="{62F939B6-93AF-4DB8-9C6B-D6C7DFDC589F}" vid="{4A3C46E8-61CC-4603-A589-7422A47A8E4A}"/>
+      <thm15:themeFamily xmlns:thm15="http://schemas.microsoft.com/office/thememl/2012/main" name="View" id="{BA0EB5A6-F2D4-4F82-977B-64ADEE4A2A69}" vid="{7B713C7F-58B7-4AE9-B361-B13EB9EC4C0C}"/>
     </a:ext>
   </a:extLst>
 </a:theme>

</xml_diff>